<commit_message>
omg all this time i just needed to swap x and y :<
</commit_message>
<xml_diff>
--- a/PS3/report_template.pptx
+++ b/PS3/report_template.pptx
@@ -6599,10 +6599,10 @@
               <a:buNone/>
             </a:pPr>
             <a:r>
-              <a:rPr lang="en"/>
-              <a:t>&lt;name&gt;</a:t>
+              <a:rPr lang="en-US" dirty="0"/>
+              <a:t>Yunqing Jia</a:t>
             </a:r>
-            <a:endParaRPr/>
+            <a:endParaRPr dirty="0"/>
           </a:p>
           <a:p>
             <a:pPr marL="0" lvl="0" indent="0" algn="ctr" rtl="0">
@@ -6615,10 +6615,10 @@
               <a:buNone/>
             </a:pPr>
             <a:r>
-              <a:rPr lang="en"/>
-              <a:t>&lt;GT email&gt;</a:t>
+              <a:rPr lang="en-US" dirty="0"/>
+              <a:t>yjia16@gatech.edu</a:t>
             </a:r>
-            <a:endParaRPr/>
+            <a:endParaRPr dirty="0"/>
           </a:p>
           <a:p>
             <a:pPr marL="0" lvl="0" indent="0" algn="ctr" rtl="0">
@@ -6631,10 +6631,10 @@
               <a:buNone/>
             </a:pPr>
             <a:r>
-              <a:rPr lang="en"/>
-              <a:t>&lt;GT username&gt;</a:t>
+              <a:rPr lang="en-US" dirty="0"/>
+              <a:t>yjia67</a:t>
             </a:r>
-            <a:endParaRPr/>
+            <a:endParaRPr dirty="0"/>
           </a:p>
           <a:p>
             <a:pPr marL="0" lvl="0" indent="0" algn="ctr" rtl="0">
@@ -6647,10 +6647,10 @@
               <a:buNone/>
             </a:pPr>
             <a:r>
-              <a:rPr lang="en"/>
-              <a:t>&lt;GTID&gt;</a:t>
+              <a:rPr lang="en" dirty="0"/>
+              <a:t>903256707</a:t>
             </a:r>
-            <a:endParaRPr/>
+            <a:endParaRPr dirty="0"/>
           </a:p>
         </p:txBody>
       </p:sp>
@@ -6967,96 +6967,194 @@
           </a:p>
         </p:txBody>
       </p:sp>
-      <p:sp>
-        <p:nvSpPr>
-          <p:cNvPr id="61" name="Google Shape;61;p14"/>
-          <p:cNvSpPr txBox="1">
-            <a:spLocks noGrp="1"/>
-          </p:cNvSpPr>
-          <p:nvPr>
-            <p:ph type="body" idx="1"/>
-          </p:nvPr>
-        </p:nvSpPr>
-        <p:spPr>
+      <p:pic>
+        <p:nvPicPr>
+          <p:cNvPr id="1030" name="Picture 6">
+            <a:extLst>
+              <a:ext uri="{FF2B5EF4-FFF2-40B4-BE49-F238E27FC236}">
+                <a16:creationId xmlns:a16="http://schemas.microsoft.com/office/drawing/2014/main" id="{76849D90-F7D3-4F48-BEF0-2CD8E8991235}"/>
+              </a:ext>
+            </a:extLst>
+          </p:cNvPr>
+          <p:cNvPicPr>
+            <a:picLocks noChangeAspect="1" noChangeArrowheads="1"/>
+          </p:cNvPicPr>
+          <p:nvPr/>
+        </p:nvPicPr>
+        <p:blipFill>
+          <a:blip r:embed="rId3">
+            <a:extLst>
+              <a:ext uri="{28A0092B-C50C-407E-A947-70E740481C1C}">
+                <a14:useLocalDpi xmlns:a14="http://schemas.microsoft.com/office/drawing/2010/main" val="0"/>
+              </a:ext>
+            </a:extLst>
+          </a:blip>
+          <a:srcRect/>
+          <a:stretch>
+            <a:fillRect/>
+          </a:stretch>
+        </p:blipFill>
+        <p:spPr bwMode="auto">
           <a:xfrm>
-            <a:off x="311700" y="1152475"/>
-            <a:ext cx="3999900" cy="3416400"/>
+            <a:off x="484510" y="1336876"/>
+            <a:ext cx="2102432" cy="2487384"/>
           </a:xfrm>
           <a:prstGeom prst="rect">
             <a:avLst/>
           </a:prstGeom>
+          <a:noFill/>
+          <a:extLst>
+            <a:ext uri="{909E8E84-426E-40DD-AFC4-6F175D3DCCD1}">
+              <a14:hiddenFill xmlns:a14="http://schemas.microsoft.com/office/drawing/2010/main">
+                <a:solidFill>
+                  <a:srgbClr val="FFFFFF"/>
+                </a:solidFill>
+              </a14:hiddenFill>
+            </a:ext>
+          </a:extLst>
         </p:spPr>
-        <p:txBody>
-          <a:bodyPr spcFirstLastPara="1" wrap="square" lIns="91425" tIns="91425" rIns="91425" bIns="91425" anchor="t" anchorCtr="0">
-            <a:noAutofit/>
-          </a:bodyPr>
-          <a:lstStyle/>
-          <a:p>
-            <a:pPr marL="0" lvl="0" indent="0" algn="l" rtl="0">
-              <a:spcBef>
-                <a:spcPts val="0"/>
-              </a:spcBef>
-              <a:spcAft>
-                <a:spcPts val="1600"/>
-              </a:spcAft>
-              <a:buNone/>
-            </a:pPr>
-            <a:r>
-              <a:rPr lang="en" dirty="0"/>
-              <a:t>&lt;insert visualization of Notre Dame interest points from proj3.ipynb here&gt;</a:t>
-            </a:r>
-            <a:endParaRPr dirty="0"/>
-          </a:p>
-        </p:txBody>
-      </p:sp>
-      <p:sp>
-        <p:nvSpPr>
-          <p:cNvPr id="62" name="Google Shape;62;p14"/>
-          <p:cNvSpPr txBox="1">
-            <a:spLocks noGrp="1"/>
-          </p:cNvSpPr>
-          <p:nvPr>
-            <p:ph type="body" idx="2"/>
-          </p:nvPr>
-        </p:nvSpPr>
-        <p:spPr>
+      </p:pic>
+      <p:pic>
+        <p:nvPicPr>
+          <p:cNvPr id="1032" name="Picture 8">
+            <a:extLst>
+              <a:ext uri="{FF2B5EF4-FFF2-40B4-BE49-F238E27FC236}">
+                <a16:creationId xmlns:a16="http://schemas.microsoft.com/office/drawing/2014/main" id="{2C3E8BE8-5217-4021-B95A-A9288707746F}"/>
+              </a:ext>
+            </a:extLst>
+          </p:cNvPr>
+          <p:cNvPicPr>
+            <a:picLocks noChangeAspect="1" noChangeArrowheads="1"/>
+          </p:cNvPicPr>
+          <p:nvPr/>
+        </p:nvPicPr>
+        <p:blipFill>
+          <a:blip r:embed="rId4">
+            <a:extLst>
+              <a:ext uri="{28A0092B-C50C-407E-A947-70E740481C1C}">
+                <a14:useLocalDpi xmlns:a14="http://schemas.microsoft.com/office/drawing/2010/main" val="0"/>
+              </a:ext>
+            </a:extLst>
+          </a:blip>
+          <a:srcRect/>
+          <a:stretch>
+            <a:fillRect/>
+          </a:stretch>
+        </p:blipFill>
+        <p:spPr bwMode="auto">
           <a:xfrm>
-            <a:off x="4832400" y="1152475"/>
-            <a:ext cx="3999900" cy="3416400"/>
+            <a:off x="2658485" y="1336876"/>
+            <a:ext cx="2102432" cy="2487383"/>
           </a:xfrm>
           <a:prstGeom prst="rect">
             <a:avLst/>
           </a:prstGeom>
+          <a:noFill/>
+          <a:extLst>
+            <a:ext uri="{909E8E84-426E-40DD-AFC4-6F175D3DCCD1}">
+              <a14:hiddenFill xmlns:a14="http://schemas.microsoft.com/office/drawing/2010/main">
+                <a:solidFill>
+                  <a:srgbClr val="FFFFFF"/>
+                </a:solidFill>
+              </a14:hiddenFill>
+            </a:ext>
+          </a:extLst>
         </p:spPr>
-        <p:txBody>
-          <a:bodyPr spcFirstLastPara="1" wrap="square" lIns="91425" tIns="91425" rIns="91425" bIns="91425" anchor="t" anchorCtr="0">
-            <a:noAutofit/>
-          </a:bodyPr>
-          <a:lstStyle/>
-          <a:p>
-            <a:pPr marL="0" indent="0">
-              <a:spcAft>
-                <a:spcPts val="1600"/>
-              </a:spcAft>
-              <a:buNone/>
-            </a:pPr>
-            <a:r>
-              <a:rPr lang="en-US" dirty="0"/>
-              <a:t>&lt; insert visualization of Rushmore interest points from proj3.ipynb here &gt;</a:t>
-            </a:r>
-            <a:endParaRPr lang="en-US" b="1" dirty="0"/>
-          </a:p>
-          <a:p>
-            <a:pPr marL="0" lvl="0" indent="0">
-              <a:spcAft>
-                <a:spcPts val="1600"/>
-              </a:spcAft>
-              <a:buNone/>
-            </a:pPr>
-            <a:endParaRPr dirty="0"/>
-          </a:p>
-        </p:txBody>
-      </p:sp>
+      </p:pic>
+      <p:pic>
+        <p:nvPicPr>
+          <p:cNvPr id="1036" name="Picture 12">
+            <a:extLst>
+              <a:ext uri="{FF2B5EF4-FFF2-40B4-BE49-F238E27FC236}">
+                <a16:creationId xmlns:a16="http://schemas.microsoft.com/office/drawing/2014/main" id="{94F6E83F-D2AF-4E50-B0DA-EDA27BA5B2B8}"/>
+              </a:ext>
+            </a:extLst>
+          </p:cNvPr>
+          <p:cNvPicPr>
+            <a:picLocks noChangeAspect="1" noChangeArrowheads="1"/>
+          </p:cNvPicPr>
+          <p:nvPr/>
+        </p:nvPicPr>
+        <p:blipFill>
+          <a:blip r:embed="rId5">
+            <a:extLst>
+              <a:ext uri="{28A0092B-C50C-407E-A947-70E740481C1C}">
+                <a14:useLocalDpi xmlns:a14="http://schemas.microsoft.com/office/drawing/2010/main" val="0"/>
+              </a:ext>
+            </a:extLst>
+          </a:blip>
+          <a:srcRect/>
+          <a:stretch>
+            <a:fillRect/>
+          </a:stretch>
+        </p:blipFill>
+        <p:spPr bwMode="auto">
+          <a:xfrm>
+            <a:off x="5410984" y="445025"/>
+            <a:ext cx="2737593" cy="2071692"/>
+          </a:xfrm>
+          <a:prstGeom prst="rect">
+            <a:avLst/>
+          </a:prstGeom>
+          <a:noFill/>
+          <a:extLst>
+            <a:ext uri="{909E8E84-426E-40DD-AFC4-6F175D3DCCD1}">
+              <a14:hiddenFill xmlns:a14="http://schemas.microsoft.com/office/drawing/2010/main">
+                <a:solidFill>
+                  <a:srgbClr val="FFFFFF"/>
+                </a:solidFill>
+              </a14:hiddenFill>
+            </a:ext>
+          </a:extLst>
+        </p:spPr>
+      </p:pic>
+      <p:pic>
+        <p:nvPicPr>
+          <p:cNvPr id="1038" name="Picture 14">
+            <a:extLst>
+              <a:ext uri="{FF2B5EF4-FFF2-40B4-BE49-F238E27FC236}">
+                <a16:creationId xmlns:a16="http://schemas.microsoft.com/office/drawing/2014/main" id="{5FF55E37-433F-4108-9A3A-A170CABD4F0C}"/>
+              </a:ext>
+            </a:extLst>
+          </p:cNvPr>
+          <p:cNvPicPr>
+            <a:picLocks noChangeAspect="1" noChangeArrowheads="1"/>
+          </p:cNvPicPr>
+          <p:nvPr/>
+        </p:nvPicPr>
+        <p:blipFill>
+          <a:blip r:embed="rId6">
+            <a:extLst>
+              <a:ext uri="{28A0092B-C50C-407E-A947-70E740481C1C}">
+                <a14:useLocalDpi xmlns:a14="http://schemas.microsoft.com/office/drawing/2010/main" val="0"/>
+              </a:ext>
+            </a:extLst>
+          </a:blip>
+          <a:srcRect/>
+          <a:stretch>
+            <a:fillRect/>
+          </a:stretch>
+        </p:blipFill>
+        <p:spPr bwMode="auto">
+          <a:xfrm>
+            <a:off x="5410984" y="2571750"/>
+            <a:ext cx="2860908" cy="2071692"/>
+          </a:xfrm>
+          <a:prstGeom prst="rect">
+            <a:avLst/>
+          </a:prstGeom>
+          <a:noFill/>
+          <a:extLst>
+            <a:ext uri="{909E8E84-426E-40DD-AFC4-6F175D3DCCD1}">
+              <a14:hiddenFill xmlns:a14="http://schemas.microsoft.com/office/drawing/2010/main">
+                <a:solidFill>
+                  <a:srgbClr val="FFFFFF"/>
+                </a:solidFill>
+              </a14:hiddenFill>
+            </a:ext>
+          </a:extLst>
+        </p:spPr>
+      </p:pic>
     </p:spTree>
   </p:cSld>
   <p:clrMapOvr>
@@ -7120,66 +7218,100 @@
           </a:p>
         </p:txBody>
       </p:sp>
-      <p:sp>
-        <p:nvSpPr>
-          <p:cNvPr id="68" name="Google Shape;68;p15"/>
-          <p:cNvSpPr txBox="1">
-            <a:spLocks noGrp="1"/>
-          </p:cNvSpPr>
-          <p:nvPr>
-            <p:ph type="body" idx="1"/>
-          </p:nvPr>
-        </p:nvSpPr>
-        <p:spPr>
+      <p:pic>
+        <p:nvPicPr>
+          <p:cNvPr id="2050" name="Picture 2">
+            <a:extLst>
+              <a:ext uri="{FF2B5EF4-FFF2-40B4-BE49-F238E27FC236}">
+                <a16:creationId xmlns:a16="http://schemas.microsoft.com/office/drawing/2014/main" id="{78BEB0C7-B36B-410B-81C5-E78C86FA57AC}"/>
+              </a:ext>
+            </a:extLst>
+          </p:cNvPr>
+          <p:cNvPicPr>
+            <a:picLocks noChangeAspect="1" noChangeArrowheads="1"/>
+          </p:cNvPicPr>
+          <p:nvPr/>
+        </p:nvPicPr>
+        <p:blipFill>
+          <a:blip r:embed="rId3">
+            <a:extLst>
+              <a:ext uri="{28A0092B-C50C-407E-A947-70E740481C1C}">
+                <a14:useLocalDpi xmlns:a14="http://schemas.microsoft.com/office/drawing/2010/main" val="0"/>
+              </a:ext>
+            </a:extLst>
+          </a:blip>
+          <a:srcRect/>
+          <a:stretch>
+            <a:fillRect/>
+          </a:stretch>
+        </p:blipFill>
+        <p:spPr bwMode="auto">
           <a:xfrm>
-            <a:off x="264566" y="982793"/>
-            <a:ext cx="3999900" cy="3416400"/>
+            <a:off x="579939" y="1221128"/>
+            <a:ext cx="3615251" cy="2679539"/>
           </a:xfrm>
           <a:prstGeom prst="rect">
             <a:avLst/>
           </a:prstGeom>
+          <a:noFill/>
+          <a:extLst>
+            <a:ext uri="{909E8E84-426E-40DD-AFC4-6F175D3DCCD1}">
+              <a14:hiddenFill xmlns:a14="http://schemas.microsoft.com/office/drawing/2010/main">
+                <a:solidFill>
+                  <a:srgbClr val="FFFFFF"/>
+                </a:solidFill>
+              </a14:hiddenFill>
+            </a:ext>
+          </a:extLst>
         </p:spPr>
-        <p:txBody>
-          <a:bodyPr spcFirstLastPara="1" wrap="square" lIns="91425" tIns="91425" rIns="91425" bIns="91425" anchor="t" anchorCtr="0">
-            <a:noAutofit/>
-          </a:bodyPr>
-          <a:lstStyle/>
-          <a:p>
-            <a:pPr marL="0" lvl="0" indent="0">
-              <a:spcBef>
-                <a:spcPts val="1600"/>
-              </a:spcBef>
-              <a:buClr>
-                <a:schemeClr val="dk1"/>
-              </a:buClr>
-              <a:buSzPts val="1100"/>
-              <a:buNone/>
-            </a:pPr>
-            <a:r>
-              <a:rPr lang="en-US" dirty="0"/>
-              <a:t>&lt; insert visualization of Gaudi interest points from proj3.ipynb here &gt;</a:t>
-            </a:r>
-            <a:endParaRPr lang="en-US" b="1" dirty="0"/>
-          </a:p>
-          <a:p>
-            <a:pPr marL="0" lvl="0" indent="0" algn="l" rtl="0">
-              <a:spcBef>
-                <a:spcPts val="1600"/>
-              </a:spcBef>
-              <a:spcAft>
-                <a:spcPts val="1600"/>
-              </a:spcAft>
-              <a:buClr>
-                <a:schemeClr val="dk1"/>
-              </a:buClr>
-              <a:buSzPts val="1100"/>
-              <a:buFont typeface="Arial"/>
-              <a:buNone/>
-            </a:pPr>
-            <a:endParaRPr dirty="0"/>
-          </a:p>
-        </p:txBody>
-      </p:sp>
+      </p:pic>
+      <p:pic>
+        <p:nvPicPr>
+          <p:cNvPr id="2052" name="Picture 4">
+            <a:extLst>
+              <a:ext uri="{FF2B5EF4-FFF2-40B4-BE49-F238E27FC236}">
+                <a16:creationId xmlns:a16="http://schemas.microsoft.com/office/drawing/2014/main" id="{80DA5C3F-6DF0-4505-966B-A7CE88425D2F}"/>
+              </a:ext>
+            </a:extLst>
+          </p:cNvPr>
+          <p:cNvPicPr>
+            <a:picLocks noChangeAspect="1" noChangeArrowheads="1"/>
+          </p:cNvPicPr>
+          <p:nvPr/>
+        </p:nvPicPr>
+        <p:blipFill>
+          <a:blip r:embed="rId4">
+            <a:extLst>
+              <a:ext uri="{28A0092B-C50C-407E-A947-70E740481C1C}">
+                <a14:useLocalDpi xmlns:a14="http://schemas.microsoft.com/office/drawing/2010/main" val="0"/>
+              </a:ext>
+            </a:extLst>
+          </a:blip>
+          <a:srcRect/>
+          <a:stretch>
+            <a:fillRect/>
+          </a:stretch>
+        </p:blipFill>
+        <p:spPr bwMode="auto">
+          <a:xfrm>
+            <a:off x="4480999" y="1221127"/>
+            <a:ext cx="3934244" cy="2679539"/>
+          </a:xfrm>
+          <a:prstGeom prst="rect">
+            <a:avLst/>
+          </a:prstGeom>
+          <a:noFill/>
+          <a:extLst>
+            <a:ext uri="{909E8E84-426E-40DD-AFC4-6F175D3DCCD1}">
+              <a14:hiddenFill xmlns:a14="http://schemas.microsoft.com/office/drawing/2010/main">
+                <a:solidFill>
+                  <a:srgbClr val="FFFFFF"/>
+                </a:solidFill>
+              </a14:hiddenFill>
+            </a:ext>
+          </a:extLst>
+        </p:spPr>
+      </p:pic>
     </p:spTree>
   </p:cSld>
   <p:clrMapOvr>
@@ -7255,7 +7387,7 @@
         </p:nvSpPr>
         <p:spPr>
           <a:xfrm>
-            <a:off x="311700" y="1152475"/>
+            <a:off x="311700" y="1017725"/>
             <a:ext cx="8520600" cy="3642162"/>
           </a:xfrm>
           <a:prstGeom prst="rect">
@@ -7268,42 +7400,35 @@
           </a:bodyPr>
           <a:lstStyle/>
           <a:p>
-            <a:pPr marL="285750" indent="-285750">
+            <a:pPr marL="0" indent="0">
               <a:spcAft>
                 <a:spcPts val="1600"/>
               </a:spcAft>
+              <a:buNone/>
             </a:pPr>
             <a:r>
               <a:rPr lang="en-US" dirty="0"/>
-              <a:t>Briefly describe how the Harris corner detector works.</a:t>
+              <a:t>The Harris corner detector searches for potential corner pixels in an image through multiple layers of convolution. The algorithm computes the grayscale pixel gradients with respect to x and with respect to y using </a:t>
+            </a:r>
+            <a:r>
+              <a:rPr lang="en-US" dirty="0" err="1"/>
+              <a:t>sobel</a:t>
+            </a:r>
+            <a:r>
+              <a:rPr lang="en-US" dirty="0"/>
+              <a:t> filters, and then the second moments to ensure that the corner detection is rotational invariant, and then computes the corner score by subtracting the alpha*trace of the matrix from the determinant of the second moment matrix. Non-maximum suppression and removal of border values were also applied to remove pixels that are not local maximums or are too close to the edge.</a:t>
             </a:r>
           </a:p>
           <a:p>
-            <a:pPr marL="0" lvl="0" indent="0">
+            <a:pPr marL="0" indent="0">
               <a:spcAft>
                 <a:spcPts val="1600"/>
               </a:spcAft>
               <a:buNone/>
-            </a:pPr>
-            <a:endParaRPr lang="en-US" dirty="0"/>
-          </a:p>
-          <a:p>
-            <a:pPr marL="285750" indent="-285750">
-              <a:spcAft>
-                <a:spcPts val="1600"/>
-              </a:spcAft>
-            </a:pPr>
-            <a:endParaRPr lang="en-US" dirty="0"/>
-          </a:p>
-          <a:p>
-            <a:pPr marL="285750" indent="-285750">
-              <a:spcAft>
-                <a:spcPts val="1600"/>
-              </a:spcAft>
             </a:pPr>
             <a:r>
               <a:rPr lang="en-US" dirty="0"/>
-              <a:t>What does the </a:t>
+              <a:t>The </a:t>
             </a:r>
             <a:r>
               <a:rPr lang="en-US" dirty="0" err="1"/>
@@ -7311,26 +7436,27 @@
             </a:r>
             <a:r>
               <a:rPr lang="en-US" dirty="0"/>
-              <a:t>() helper function do?</a:t>
+              <a:t>() helper function convolves the image gradients with respect to x and with respect to y with a Gaussian kernel and computes the Ix^2, Iy^2, and </a:t>
+            </a:r>
+            <a:r>
+              <a:rPr lang="en-US" dirty="0" err="1"/>
+              <a:t>IxIy</a:t>
+            </a:r>
+            <a:r>
+              <a:rPr lang="en-US" dirty="0"/>
+              <a:t> terms in each image slice’s principal components (directions with maximum variation), such that the corner detection is rotational invariant. </a:t>
             </a:r>
           </a:p>
           <a:p>
-            <a:pPr marL="285750" indent="-285750">
+            <a:pPr marL="0" indent="0">
               <a:spcAft>
                 <a:spcPts val="1600"/>
               </a:spcAft>
-            </a:pPr>
-            <a:endParaRPr lang="en-US" dirty="0"/>
-          </a:p>
-          <a:p>
-            <a:pPr marL="285750" indent="-285750">
-              <a:spcAft>
-                <a:spcPts val="1600"/>
-              </a:spcAft>
+              <a:buNone/>
             </a:pPr>
             <a:r>
               <a:rPr lang="en-US" dirty="0"/>
-              <a:t>What does the </a:t>
+              <a:t>The </a:t>
             </a:r>
             <a:r>
               <a:rPr lang="en-US" dirty="0" err="1"/>
@@ -7338,7 +7464,15 @@
             </a:r>
             <a:r>
               <a:rPr lang="en-US" dirty="0"/>
-              <a:t>() helper function do?</a:t>
+              <a:t>() helper function essentially computes the (lambda_1*lambda_2)/(lambda_1+lambda_2) term for each pixel by applying the formula: R = det(M) – alpha*trace(M)^2 (done by </a:t>
+            </a:r>
+            <a:r>
+              <a:rPr lang="en-US" dirty="0" err="1"/>
+              <a:t>numpy</a:t>
+            </a:r>
+            <a:r>
+              <a:rPr lang="en-US" dirty="0"/>
+              <a:t> array broadcasting). The function outputs corner response score that is large only in the case where the gradient is large in both directions (i.e. large pixel variation in both x and y direction).</a:t>
             </a:r>
             <a:br>
               <a:rPr lang="en-US" dirty="0"/>

</xml_diff>